<commit_message>
Minor updates to the Solarium presentation.
</commit_message>
<xml_diff>
--- a/doc/Solarium.pptx
+++ b/doc/Solarium.pptx
@@ -111,7 +111,16 @@
       </a:defRPr>
     </a:lvl9pPr>
   </p:defaultTextStyle>
+  <p:extLst>
+    <p:ext uri="{EFAFB233-063F-42B5-8137-9DF3F51BA10A}">
+      <p15:sldGuideLst xmlns:p15="http://schemas.microsoft.com/office/powerpoint/2012/main"/>
+    </p:ext>
+  </p:extLst>
 </p:presentation>
+</file>
+
+<file path=ppt/revisionInfo.xml><?xml version="1.0" encoding="utf-8"?>
+<p1510:revInfo xmlns:a="http://schemas.openxmlformats.org/drawingml/2006/main" xmlns:r="http://schemas.openxmlformats.org/officeDocument/2006/relationships" xmlns:p1510="http://schemas.microsoft.com/office/powerpoint/2015/10/main"/>
 </file>
 
 <file path=ppt/slideLayouts/slideLayout1.xml><?xml version="1.0" encoding="utf-8"?>
@@ -156,10 +165,9 @@
           </a:lstStyle>
           <a:p>
             <a:r>
-              <a:rPr lang="en-US" smtClean="0"/>
+              <a:rPr lang="en-US"/>
               <a:t>Click to edit Master title style</a:t>
             </a:r>
-            <a:endParaRPr lang="en-US"/>
           </a:p>
         </p:txBody>
       </p:sp>
@@ -221,10 +229,9 @@
           </a:lstStyle>
           <a:p>
             <a:r>
-              <a:rPr lang="en-US" smtClean="0"/>
+              <a:rPr lang="en-US"/>
               <a:t>Click to edit Master subtitle style</a:t>
             </a:r>
-            <a:endParaRPr lang="en-US"/>
           </a:p>
         </p:txBody>
       </p:sp>
@@ -245,7 +252,7 @@
           <a:p>
             <a:fld id="{422AF894-0F86-4334-AADC-73402EE9FAEC}" type="datetimeFigureOut">
               <a:rPr lang="en-US" smtClean="0"/>
-              <a:t>2015-08-31</a:t>
+              <a:t>2018-01-22</a:t>
             </a:fld>
             <a:endParaRPr lang="en-US"/>
           </a:p>
@@ -339,10 +346,9 @@
           <a:lstStyle/>
           <a:p>
             <a:r>
-              <a:rPr lang="en-US" smtClean="0"/>
+              <a:rPr lang="en-US"/>
               <a:t>Click to edit Master title style</a:t>
             </a:r>
-            <a:endParaRPr lang="en-US"/>
           </a:p>
         </p:txBody>
       </p:sp>
@@ -363,38 +369,37 @@
           <a:p>
             <a:pPr lvl="0"/>
             <a:r>
-              <a:rPr lang="en-US" smtClean="0"/>
+              <a:rPr lang="en-US"/>
               <a:t>Click to edit Master text styles</a:t>
             </a:r>
           </a:p>
           <a:p>
             <a:pPr lvl="1"/>
             <a:r>
-              <a:rPr lang="en-US" smtClean="0"/>
+              <a:rPr lang="en-US"/>
               <a:t>Second level</a:t>
             </a:r>
           </a:p>
           <a:p>
             <a:pPr lvl="2"/>
             <a:r>
-              <a:rPr lang="en-US" smtClean="0"/>
+              <a:rPr lang="en-US"/>
               <a:t>Third level</a:t>
             </a:r>
           </a:p>
           <a:p>
             <a:pPr lvl="3"/>
             <a:r>
-              <a:rPr lang="en-US" smtClean="0"/>
+              <a:rPr lang="en-US"/>
               <a:t>Fourth level</a:t>
             </a:r>
           </a:p>
           <a:p>
             <a:pPr lvl="4"/>
             <a:r>
-              <a:rPr lang="en-US" smtClean="0"/>
+              <a:rPr lang="en-US"/>
               <a:t>Fifth level</a:t>
             </a:r>
-            <a:endParaRPr lang="en-US"/>
           </a:p>
         </p:txBody>
       </p:sp>
@@ -415,7 +420,7 @@
           <a:p>
             <a:fld id="{422AF894-0F86-4334-AADC-73402EE9FAEC}" type="datetimeFigureOut">
               <a:rPr lang="en-US" smtClean="0"/>
-              <a:t>2015-08-31</a:t>
+              <a:t>2018-01-22</a:t>
             </a:fld>
             <a:endParaRPr lang="en-US"/>
           </a:p>
@@ -514,10 +519,9 @@
           <a:lstStyle/>
           <a:p>
             <a:r>
-              <a:rPr lang="en-US" smtClean="0"/>
+              <a:rPr lang="en-US"/>
               <a:t>Click to edit Master title style</a:t>
             </a:r>
-            <a:endParaRPr lang="en-US"/>
           </a:p>
         </p:txBody>
       </p:sp>
@@ -543,38 +547,37 @@
           <a:p>
             <a:pPr lvl="0"/>
             <a:r>
-              <a:rPr lang="en-US" smtClean="0"/>
+              <a:rPr lang="en-US"/>
               <a:t>Click to edit Master text styles</a:t>
             </a:r>
           </a:p>
           <a:p>
             <a:pPr lvl="1"/>
             <a:r>
-              <a:rPr lang="en-US" smtClean="0"/>
+              <a:rPr lang="en-US"/>
               <a:t>Second level</a:t>
             </a:r>
           </a:p>
           <a:p>
             <a:pPr lvl="2"/>
             <a:r>
-              <a:rPr lang="en-US" smtClean="0"/>
+              <a:rPr lang="en-US"/>
               <a:t>Third level</a:t>
             </a:r>
           </a:p>
           <a:p>
             <a:pPr lvl="3"/>
             <a:r>
-              <a:rPr lang="en-US" smtClean="0"/>
+              <a:rPr lang="en-US"/>
               <a:t>Fourth level</a:t>
             </a:r>
           </a:p>
           <a:p>
             <a:pPr lvl="4"/>
             <a:r>
-              <a:rPr lang="en-US" smtClean="0"/>
+              <a:rPr lang="en-US"/>
               <a:t>Fifth level</a:t>
             </a:r>
-            <a:endParaRPr lang="en-US"/>
           </a:p>
         </p:txBody>
       </p:sp>
@@ -595,7 +598,7 @@
           <a:p>
             <a:fld id="{422AF894-0F86-4334-AADC-73402EE9FAEC}" type="datetimeFigureOut">
               <a:rPr lang="en-US" smtClean="0"/>
-              <a:t>2015-08-31</a:t>
+              <a:t>2018-01-22</a:t>
             </a:fld>
             <a:endParaRPr lang="en-US"/>
           </a:p>
@@ -689,10 +692,9 @@
           <a:lstStyle/>
           <a:p>
             <a:r>
-              <a:rPr lang="en-US" smtClean="0"/>
+              <a:rPr lang="en-US"/>
               <a:t>Click to edit Master title style</a:t>
             </a:r>
-            <a:endParaRPr lang="en-US"/>
           </a:p>
         </p:txBody>
       </p:sp>
@@ -713,38 +715,37 @@
           <a:p>
             <a:pPr lvl="0"/>
             <a:r>
-              <a:rPr lang="en-US" smtClean="0"/>
+              <a:rPr lang="en-US"/>
               <a:t>Click to edit Master text styles</a:t>
             </a:r>
           </a:p>
           <a:p>
             <a:pPr lvl="1"/>
             <a:r>
-              <a:rPr lang="en-US" smtClean="0"/>
+              <a:rPr lang="en-US"/>
               <a:t>Second level</a:t>
             </a:r>
           </a:p>
           <a:p>
             <a:pPr lvl="2"/>
             <a:r>
-              <a:rPr lang="en-US" smtClean="0"/>
+              <a:rPr lang="en-US"/>
               <a:t>Third level</a:t>
             </a:r>
           </a:p>
           <a:p>
             <a:pPr lvl="3"/>
             <a:r>
-              <a:rPr lang="en-US" smtClean="0"/>
+              <a:rPr lang="en-US"/>
               <a:t>Fourth level</a:t>
             </a:r>
           </a:p>
           <a:p>
             <a:pPr lvl="4"/>
             <a:r>
-              <a:rPr lang="en-US" smtClean="0"/>
+              <a:rPr lang="en-US"/>
               <a:t>Fifth level</a:t>
             </a:r>
-            <a:endParaRPr lang="en-US"/>
           </a:p>
         </p:txBody>
       </p:sp>
@@ -765,7 +766,7 @@
           <a:p>
             <a:fld id="{422AF894-0F86-4334-AADC-73402EE9FAEC}" type="datetimeFigureOut">
               <a:rPr lang="en-US" smtClean="0"/>
-              <a:t>2015-08-31</a:t>
+              <a:t>2018-01-22</a:t>
             </a:fld>
             <a:endParaRPr lang="en-US"/>
           </a:p>
@@ -868,10 +869,9 @@
           </a:lstStyle>
           <a:p>
             <a:r>
-              <a:rPr lang="en-US" smtClean="0"/>
+              <a:rPr lang="en-US"/>
               <a:t>Click to edit Master title style</a:t>
             </a:r>
-            <a:endParaRPr lang="en-US"/>
           </a:p>
         </p:txBody>
       </p:sp>
@@ -988,7 +988,7 @@
           <a:p>
             <a:pPr lvl="0"/>
             <a:r>
-              <a:rPr lang="en-US" smtClean="0"/>
+              <a:rPr lang="en-US"/>
               <a:t>Click to edit Master text styles</a:t>
             </a:r>
           </a:p>
@@ -1011,7 +1011,7 @@
           <a:p>
             <a:fld id="{422AF894-0F86-4334-AADC-73402EE9FAEC}" type="datetimeFigureOut">
               <a:rPr lang="en-US" smtClean="0"/>
-              <a:t>2015-08-31</a:t>
+              <a:t>2018-01-22</a:t>
             </a:fld>
             <a:endParaRPr lang="en-US"/>
           </a:p>
@@ -1105,10 +1105,9 @@
           <a:lstStyle/>
           <a:p>
             <a:r>
-              <a:rPr lang="en-US" smtClean="0"/>
+              <a:rPr lang="en-US"/>
               <a:t>Click to edit Master title style</a:t>
             </a:r>
-            <a:endParaRPr lang="en-US"/>
           </a:p>
         </p:txBody>
       </p:sp>
@@ -1134,38 +1133,37 @@
           <a:p>
             <a:pPr lvl="0"/>
             <a:r>
-              <a:rPr lang="en-US" smtClean="0"/>
+              <a:rPr lang="en-US"/>
               <a:t>Click to edit Master text styles</a:t>
             </a:r>
           </a:p>
           <a:p>
             <a:pPr lvl="1"/>
             <a:r>
-              <a:rPr lang="en-US" smtClean="0"/>
+              <a:rPr lang="en-US"/>
               <a:t>Second level</a:t>
             </a:r>
           </a:p>
           <a:p>
             <a:pPr lvl="2"/>
             <a:r>
-              <a:rPr lang="en-US" smtClean="0"/>
+              <a:rPr lang="en-US"/>
               <a:t>Third level</a:t>
             </a:r>
           </a:p>
           <a:p>
             <a:pPr lvl="3"/>
             <a:r>
-              <a:rPr lang="en-US" smtClean="0"/>
+              <a:rPr lang="en-US"/>
               <a:t>Fourth level</a:t>
             </a:r>
           </a:p>
           <a:p>
             <a:pPr lvl="4"/>
             <a:r>
-              <a:rPr lang="en-US" smtClean="0"/>
+              <a:rPr lang="en-US"/>
               <a:t>Fifth level</a:t>
             </a:r>
-            <a:endParaRPr lang="en-US"/>
           </a:p>
         </p:txBody>
       </p:sp>
@@ -1191,38 +1189,37 @@
           <a:p>
             <a:pPr lvl="0"/>
             <a:r>
-              <a:rPr lang="en-US" smtClean="0"/>
+              <a:rPr lang="en-US"/>
               <a:t>Click to edit Master text styles</a:t>
             </a:r>
           </a:p>
           <a:p>
             <a:pPr lvl="1"/>
             <a:r>
-              <a:rPr lang="en-US" smtClean="0"/>
+              <a:rPr lang="en-US"/>
               <a:t>Second level</a:t>
             </a:r>
           </a:p>
           <a:p>
             <a:pPr lvl="2"/>
             <a:r>
-              <a:rPr lang="en-US" smtClean="0"/>
+              <a:rPr lang="en-US"/>
               <a:t>Third level</a:t>
             </a:r>
           </a:p>
           <a:p>
             <a:pPr lvl="3"/>
             <a:r>
-              <a:rPr lang="en-US" smtClean="0"/>
+              <a:rPr lang="en-US"/>
               <a:t>Fourth level</a:t>
             </a:r>
           </a:p>
           <a:p>
             <a:pPr lvl="4"/>
             <a:r>
-              <a:rPr lang="en-US" smtClean="0"/>
+              <a:rPr lang="en-US"/>
               <a:t>Fifth level</a:t>
             </a:r>
-            <a:endParaRPr lang="en-US"/>
           </a:p>
         </p:txBody>
       </p:sp>
@@ -1243,7 +1240,7 @@
           <a:p>
             <a:fld id="{422AF894-0F86-4334-AADC-73402EE9FAEC}" type="datetimeFigureOut">
               <a:rPr lang="en-US" smtClean="0"/>
-              <a:t>2015-08-31</a:t>
+              <a:t>2018-01-22</a:t>
             </a:fld>
             <a:endParaRPr lang="en-US"/>
           </a:p>
@@ -1342,10 +1339,9 @@
           <a:lstStyle/>
           <a:p>
             <a:r>
-              <a:rPr lang="en-US" smtClean="0"/>
+              <a:rPr lang="en-US"/>
               <a:t>Click to edit Master title style</a:t>
             </a:r>
-            <a:endParaRPr lang="en-US"/>
           </a:p>
         </p:txBody>
       </p:sp>
@@ -1408,7 +1404,7 @@
           <a:p>
             <a:pPr lvl="0"/>
             <a:r>
-              <a:rPr lang="en-US" smtClean="0"/>
+              <a:rPr lang="en-US"/>
               <a:t>Click to edit Master text styles</a:t>
             </a:r>
           </a:p>
@@ -1436,38 +1432,37 @@
           <a:p>
             <a:pPr lvl="0"/>
             <a:r>
-              <a:rPr lang="en-US" smtClean="0"/>
+              <a:rPr lang="en-US"/>
               <a:t>Click to edit Master text styles</a:t>
             </a:r>
           </a:p>
           <a:p>
             <a:pPr lvl="1"/>
             <a:r>
-              <a:rPr lang="en-US" smtClean="0"/>
+              <a:rPr lang="en-US"/>
               <a:t>Second level</a:t>
             </a:r>
           </a:p>
           <a:p>
             <a:pPr lvl="2"/>
             <a:r>
-              <a:rPr lang="en-US" smtClean="0"/>
+              <a:rPr lang="en-US"/>
               <a:t>Third level</a:t>
             </a:r>
           </a:p>
           <a:p>
             <a:pPr lvl="3"/>
             <a:r>
-              <a:rPr lang="en-US" smtClean="0"/>
+              <a:rPr lang="en-US"/>
               <a:t>Fourth level</a:t>
             </a:r>
           </a:p>
           <a:p>
             <a:pPr lvl="4"/>
             <a:r>
-              <a:rPr lang="en-US" smtClean="0"/>
+              <a:rPr lang="en-US"/>
               <a:t>Fifth level</a:t>
             </a:r>
-            <a:endParaRPr lang="en-US"/>
           </a:p>
         </p:txBody>
       </p:sp>
@@ -1530,7 +1525,7 @@
           <a:p>
             <a:pPr lvl="0"/>
             <a:r>
-              <a:rPr lang="en-US" smtClean="0"/>
+              <a:rPr lang="en-US"/>
               <a:t>Click to edit Master text styles</a:t>
             </a:r>
           </a:p>
@@ -1558,38 +1553,37 @@
           <a:p>
             <a:pPr lvl="0"/>
             <a:r>
-              <a:rPr lang="en-US" smtClean="0"/>
+              <a:rPr lang="en-US"/>
               <a:t>Click to edit Master text styles</a:t>
             </a:r>
           </a:p>
           <a:p>
             <a:pPr lvl="1"/>
             <a:r>
-              <a:rPr lang="en-US" smtClean="0"/>
+              <a:rPr lang="en-US"/>
               <a:t>Second level</a:t>
             </a:r>
           </a:p>
           <a:p>
             <a:pPr lvl="2"/>
             <a:r>
-              <a:rPr lang="en-US" smtClean="0"/>
+              <a:rPr lang="en-US"/>
               <a:t>Third level</a:t>
             </a:r>
           </a:p>
           <a:p>
             <a:pPr lvl="3"/>
             <a:r>
-              <a:rPr lang="en-US" smtClean="0"/>
+              <a:rPr lang="en-US"/>
               <a:t>Fourth level</a:t>
             </a:r>
           </a:p>
           <a:p>
             <a:pPr lvl="4"/>
             <a:r>
-              <a:rPr lang="en-US" smtClean="0"/>
+              <a:rPr lang="en-US"/>
               <a:t>Fifth level</a:t>
             </a:r>
-            <a:endParaRPr lang="en-US"/>
           </a:p>
         </p:txBody>
       </p:sp>
@@ -1610,7 +1604,7 @@
           <a:p>
             <a:fld id="{422AF894-0F86-4334-AADC-73402EE9FAEC}" type="datetimeFigureOut">
               <a:rPr lang="en-US" smtClean="0"/>
-              <a:t>2015-08-31</a:t>
+              <a:t>2018-01-22</a:t>
             </a:fld>
             <a:endParaRPr lang="en-US"/>
           </a:p>
@@ -1704,10 +1698,9 @@
           <a:lstStyle/>
           <a:p>
             <a:r>
-              <a:rPr lang="en-US" smtClean="0"/>
+              <a:rPr lang="en-US"/>
               <a:t>Click to edit Master title style</a:t>
             </a:r>
-            <a:endParaRPr lang="en-US"/>
           </a:p>
         </p:txBody>
       </p:sp>
@@ -1728,7 +1721,7 @@
           <a:p>
             <a:fld id="{422AF894-0F86-4334-AADC-73402EE9FAEC}" type="datetimeFigureOut">
               <a:rPr lang="en-US" smtClean="0"/>
-              <a:t>2015-08-31</a:t>
+              <a:t>2018-01-22</a:t>
             </a:fld>
             <a:endParaRPr lang="en-US"/>
           </a:p>
@@ -1823,7 +1816,7 @@
           <a:p>
             <a:fld id="{422AF894-0F86-4334-AADC-73402EE9FAEC}" type="datetimeFigureOut">
               <a:rPr lang="en-US" smtClean="0"/>
-              <a:t>2015-08-31</a:t>
+              <a:t>2018-01-22</a:t>
             </a:fld>
             <a:endParaRPr lang="en-US"/>
           </a:p>
@@ -1926,10 +1919,9 @@
           </a:lstStyle>
           <a:p>
             <a:r>
-              <a:rPr lang="en-US" smtClean="0"/>
+              <a:rPr lang="en-US"/>
               <a:t>Click to edit Master title style</a:t>
             </a:r>
-            <a:endParaRPr lang="en-US"/>
           </a:p>
         </p:txBody>
       </p:sp>
@@ -1983,38 +1975,37 @@
           <a:p>
             <a:pPr lvl="0"/>
             <a:r>
-              <a:rPr lang="en-US" smtClean="0"/>
+              <a:rPr lang="en-US"/>
               <a:t>Click to edit Master text styles</a:t>
             </a:r>
           </a:p>
           <a:p>
             <a:pPr lvl="1"/>
             <a:r>
-              <a:rPr lang="en-US" smtClean="0"/>
+              <a:rPr lang="en-US"/>
               <a:t>Second level</a:t>
             </a:r>
           </a:p>
           <a:p>
             <a:pPr lvl="2"/>
             <a:r>
-              <a:rPr lang="en-US" smtClean="0"/>
+              <a:rPr lang="en-US"/>
               <a:t>Third level</a:t>
             </a:r>
           </a:p>
           <a:p>
             <a:pPr lvl="3"/>
             <a:r>
-              <a:rPr lang="en-US" smtClean="0"/>
+              <a:rPr lang="en-US"/>
               <a:t>Fourth level</a:t>
             </a:r>
           </a:p>
           <a:p>
             <a:pPr lvl="4"/>
             <a:r>
-              <a:rPr lang="en-US" smtClean="0"/>
+              <a:rPr lang="en-US"/>
               <a:t>Fifth level</a:t>
             </a:r>
-            <a:endParaRPr lang="en-US"/>
           </a:p>
         </p:txBody>
       </p:sp>
@@ -2077,7 +2068,7 @@
           <a:p>
             <a:pPr lvl="0"/>
             <a:r>
-              <a:rPr lang="en-US" smtClean="0"/>
+              <a:rPr lang="en-US"/>
               <a:t>Click to edit Master text styles</a:t>
             </a:r>
           </a:p>
@@ -2100,7 +2091,7 @@
           <a:p>
             <a:fld id="{422AF894-0F86-4334-AADC-73402EE9FAEC}" type="datetimeFigureOut">
               <a:rPr lang="en-US" smtClean="0"/>
-              <a:t>2015-08-31</a:t>
+              <a:t>2018-01-22</a:t>
             </a:fld>
             <a:endParaRPr lang="en-US"/>
           </a:p>
@@ -2203,10 +2194,9 @@
           </a:lstStyle>
           <a:p>
             <a:r>
-              <a:rPr lang="en-US" smtClean="0"/>
+              <a:rPr lang="en-US"/>
               <a:t>Click to edit Master title style</a:t>
             </a:r>
-            <a:endParaRPr lang="en-US"/>
           </a:p>
         </p:txBody>
       </p:sp>
@@ -2330,7 +2320,7 @@
           <a:p>
             <a:pPr lvl="0"/>
             <a:r>
-              <a:rPr lang="en-US" smtClean="0"/>
+              <a:rPr lang="en-US"/>
               <a:t>Click to edit Master text styles</a:t>
             </a:r>
           </a:p>
@@ -2353,7 +2343,7 @@
           <a:p>
             <a:fld id="{422AF894-0F86-4334-AADC-73402EE9FAEC}" type="datetimeFigureOut">
               <a:rPr lang="en-US" smtClean="0"/>
-              <a:t>2015-08-31</a:t>
+              <a:t>2018-01-22</a:t>
             </a:fld>
             <a:endParaRPr lang="en-US"/>
           </a:p>
@@ -2462,10 +2452,9 @@
           <a:lstStyle/>
           <a:p>
             <a:r>
-              <a:rPr lang="en-US" smtClean="0"/>
+              <a:rPr lang="en-US"/>
               <a:t>Click to edit Master title style</a:t>
             </a:r>
-            <a:endParaRPr lang="en-US"/>
           </a:p>
         </p:txBody>
       </p:sp>
@@ -2496,38 +2485,37 @@
           <a:p>
             <a:pPr lvl="0"/>
             <a:r>
-              <a:rPr lang="en-US" smtClean="0"/>
+              <a:rPr lang="en-US"/>
               <a:t>Click to edit Master text styles</a:t>
             </a:r>
           </a:p>
           <a:p>
             <a:pPr lvl="1"/>
             <a:r>
-              <a:rPr lang="en-US" smtClean="0"/>
+              <a:rPr lang="en-US"/>
               <a:t>Second level</a:t>
             </a:r>
           </a:p>
           <a:p>
             <a:pPr lvl="2"/>
             <a:r>
-              <a:rPr lang="en-US" smtClean="0"/>
+              <a:rPr lang="en-US"/>
               <a:t>Third level</a:t>
             </a:r>
           </a:p>
           <a:p>
             <a:pPr lvl="3"/>
             <a:r>
-              <a:rPr lang="en-US" smtClean="0"/>
+              <a:rPr lang="en-US"/>
               <a:t>Fourth level</a:t>
             </a:r>
           </a:p>
           <a:p>
             <a:pPr lvl="4"/>
             <a:r>
-              <a:rPr lang="en-US" smtClean="0"/>
+              <a:rPr lang="en-US"/>
               <a:t>Fifth level</a:t>
             </a:r>
-            <a:endParaRPr lang="en-US"/>
           </a:p>
         </p:txBody>
       </p:sp>
@@ -2566,7 +2554,7 @@
           <a:p>
             <a:fld id="{422AF894-0F86-4334-AADC-73402EE9FAEC}" type="datetimeFigureOut">
               <a:rPr lang="en-US" smtClean="0"/>
-              <a:t>2015-08-31</a:t>
+              <a:t>2018-01-22</a:t>
             </a:fld>
             <a:endParaRPr lang="en-US"/>
           </a:p>
@@ -2987,10 +2975,9 @@
           <a:lstStyle/>
           <a:p>
             <a:r>
-              <a:rPr lang="en-US" dirty="0" smtClean="0"/>
+              <a:rPr lang="en-US" dirty="0"/>
               <a:t>Solarium</a:t>
             </a:r>
-            <a:endParaRPr lang="en-US" dirty="0"/>
           </a:p>
         </p:txBody>
       </p:sp>
@@ -3010,16 +2997,15 @@
           <a:lstStyle/>
           <a:p>
             <a:r>
-              <a:rPr lang="en-US" dirty="0" smtClean="0"/>
+              <a:rPr lang="en-US" dirty="0"/>
               <a:t>A solar system simulator</a:t>
             </a:r>
           </a:p>
           <a:p>
             <a:r>
-              <a:rPr lang="en-US" dirty="0" smtClean="0"/>
+              <a:rPr lang="en-US" dirty="0"/>
               <a:t>Peter Chapin</a:t>
             </a:r>
-            <a:endParaRPr lang="en-US" dirty="0"/>
           </a:p>
         </p:txBody>
       </p:sp>
@@ -3069,10 +3055,9 @@
           <a:lstStyle/>
           <a:p>
             <a:r>
-              <a:rPr lang="en-US" dirty="0" smtClean="0"/>
+              <a:rPr lang="en-US" dirty="0"/>
               <a:t>N-Body Problem</a:t>
             </a:r>
-            <a:endParaRPr lang="en-US" dirty="0"/>
           </a:p>
         </p:txBody>
       </p:sp>
@@ -3716,13 +3701,6 @@
   <p:clrMapOvr>
     <a:masterClrMapping/>
   </p:clrMapOvr>
-  <p:timing>
-    <p:tnLst>
-      <p:par>
-        <p:cTn id="1" dur="indefinite" restart="never" nodeType="tmRoot"/>
-      </p:par>
-    </p:tnLst>
-  </p:timing>
 </p:sld>
 </file>
 
@@ -3759,10 +3737,9 @@
           <a:lstStyle/>
           <a:p>
             <a:r>
-              <a:rPr lang="en-US" dirty="0" smtClean="0"/>
+              <a:rPr lang="en-US" dirty="0"/>
               <a:t>Solarium</a:t>
             </a:r>
-            <a:endParaRPr lang="en-US" dirty="0"/>
           </a:p>
         </p:txBody>
       </p:sp>
@@ -3782,76 +3759,71 @@
           <a:lstStyle/>
           <a:p>
             <a:r>
-              <a:rPr lang="en-US" dirty="0" smtClean="0"/>
+              <a:rPr lang="en-US" dirty="0"/>
               <a:t>Simulates movement of solar system objects</a:t>
             </a:r>
           </a:p>
           <a:p>
             <a:pPr lvl="1"/>
             <a:r>
-              <a:rPr lang="en-US" dirty="0" smtClean="0"/>
-              <a:t>Considers mutual gravitation interaction</a:t>
+              <a:rPr lang="en-US" dirty="0"/>
+              <a:t>Considers mutual gravitational interaction</a:t>
             </a:r>
           </a:p>
           <a:p>
             <a:pPr lvl="1"/>
             <a:r>
-              <a:rPr lang="en-US" dirty="0" smtClean="0"/>
+              <a:rPr lang="en-US" dirty="0"/>
               <a:t>Supports many (thousands) of objects</a:t>
             </a:r>
           </a:p>
           <a:p>
             <a:pPr lvl="2"/>
             <a:r>
-              <a:rPr lang="en-US" dirty="0" smtClean="0"/>
+              <a:rPr lang="en-US" dirty="0"/>
               <a:t>Planets</a:t>
             </a:r>
           </a:p>
           <a:p>
             <a:pPr lvl="2"/>
             <a:r>
-              <a:rPr lang="en-US" dirty="0" smtClean="0"/>
+              <a:rPr lang="en-US" dirty="0"/>
               <a:t>Asteroids</a:t>
             </a:r>
           </a:p>
           <a:p>
             <a:pPr lvl="2"/>
             <a:r>
-              <a:rPr lang="en-US" dirty="0" smtClean="0"/>
+              <a:rPr lang="en-US" dirty="0"/>
               <a:t>Comets</a:t>
             </a:r>
           </a:p>
           <a:p>
             <a:pPr lvl="2"/>
             <a:r>
-              <a:rPr lang="en-US" dirty="0" smtClean="0"/>
-              <a:t>Bowling </a:t>
-            </a:r>
-            <a:r>
-              <a:rPr lang="en-US" dirty="0" smtClean="0"/>
-              <a:t>balls</a:t>
-            </a:r>
-          </a:p>
-          <a:p>
-            <a:r>
-              <a:rPr lang="en-US" dirty="0" smtClean="0"/>
+              <a:rPr lang="en-US" dirty="0"/>
+              <a:t>Bowling balls</a:t>
+            </a:r>
+          </a:p>
+          <a:p>
+            <a:r>
+              <a:rPr lang="en-US" dirty="0"/>
               <a:t>Each object represented by a “dynamics”</a:t>
             </a:r>
           </a:p>
           <a:p>
             <a:pPr lvl="1"/>
             <a:r>
-              <a:rPr lang="en-US" dirty="0" smtClean="0"/>
+              <a:rPr lang="en-US" dirty="0"/>
               <a:t>Position (x, y, z components)</a:t>
             </a:r>
           </a:p>
           <a:p>
             <a:pPr lvl="1"/>
             <a:r>
-              <a:rPr lang="en-US" dirty="0" smtClean="0"/>
+              <a:rPr lang="en-US" dirty="0"/>
               <a:t>Velocity (x, y, z components)</a:t>
             </a:r>
-            <a:endParaRPr lang="en-US" dirty="0"/>
           </a:p>
         </p:txBody>
       </p:sp>
@@ -3865,13 +3837,6 @@
   <p:clrMapOvr>
     <a:masterClrMapping/>
   </p:clrMapOvr>
-  <p:timing>
-    <p:tnLst>
-      <p:par>
-        <p:cTn id="1" dur="indefinite" restart="never" nodeType="tmRoot"/>
-      </p:par>
-    </p:tnLst>
-  </p:timing>
 </p:sld>
 </file>
 
@@ -3908,10 +3873,9 @@
           <a:lstStyle/>
           <a:p>
             <a:r>
-              <a:rPr lang="en-US" dirty="0" smtClean="0"/>
+              <a:rPr lang="en-US" dirty="0"/>
               <a:t>Time</a:t>
             </a:r>
-            <a:endParaRPr lang="en-US" dirty="0"/>
           </a:p>
         </p:txBody>
       </p:sp>
@@ -3931,85 +3895,92 @@
           <a:lstStyle/>
           <a:p>
             <a:r>
-              <a:rPr lang="en-US" dirty="0" smtClean="0"/>
+              <a:rPr lang="en-US" dirty="0"/>
               <a:t>Time is divided into “time steps”</a:t>
             </a:r>
           </a:p>
           <a:p>
             <a:r>
-              <a:rPr lang="en-US" dirty="0" smtClean="0"/>
+              <a:rPr lang="en-US" dirty="0"/>
               <a:t>For each time step…</a:t>
             </a:r>
           </a:p>
           <a:p>
             <a:pPr lvl="1"/>
             <a:r>
-              <a:rPr lang="en-US" dirty="0" smtClean="0"/>
+              <a:rPr lang="en-US" dirty="0"/>
               <a:t>For each object…</a:t>
             </a:r>
           </a:p>
           <a:p>
             <a:pPr lvl="2"/>
             <a:r>
-              <a:rPr lang="en-US" dirty="0" smtClean="0"/>
+              <a:rPr lang="en-US" dirty="0"/>
               <a:t>New position based on old position and old velocity</a:t>
             </a:r>
           </a:p>
           <a:p>
             <a:pPr lvl="2"/>
             <a:r>
-              <a:rPr lang="en-US" dirty="0" smtClean="0"/>
-              <a:t>New velocity based on old velocity and “current” acceleration</a:t>
+              <a:rPr lang="en-US" dirty="0"/>
+              <a:t>New velocity based on old velocity and current acceleration</a:t>
             </a:r>
           </a:p>
           <a:p>
             <a:pPr lvl="2"/>
             <a:r>
-              <a:rPr lang="en-US" dirty="0" smtClean="0"/>
+              <a:rPr lang="en-US" dirty="0"/>
               <a:t>Acceleration is calculated by…</a:t>
             </a:r>
           </a:p>
           <a:p>
             <a:pPr lvl="3"/>
             <a:r>
-              <a:rPr lang="en-US" dirty="0" smtClean="0"/>
+              <a:rPr lang="en-US" dirty="0"/>
               <a:t>Computing total force on an object due to gravitational attraction of all other objects (</a:t>
             </a:r>
             <a:r>
-              <a:rPr lang="en-US" i="1" dirty="0" smtClean="0"/>
+              <a:rPr lang="en-US" i="1" dirty="0"/>
               <a:t>O(N</a:t>
             </a:r>
             <a:r>
-              <a:rPr lang="en-US" i="1" baseline="30000" dirty="0" smtClean="0"/>
+              <a:rPr lang="en-US" i="1" baseline="30000" dirty="0"/>
               <a:t>2</a:t>
             </a:r>
             <a:r>
-              <a:rPr lang="en-US" i="1" dirty="0" smtClean="0"/>
+              <a:rPr lang="en-US" i="1" dirty="0"/>
               <a:t>)</a:t>
             </a:r>
             <a:r>
-              <a:rPr lang="en-US" dirty="0" smtClean="0"/>
+              <a:rPr lang="en-US" dirty="0"/>
               <a:t>)</a:t>
             </a:r>
           </a:p>
           <a:p>
             <a:pPr lvl="3"/>
             <a:r>
-              <a:rPr lang="en-US" i="1" dirty="0" smtClean="0"/>
+              <a:rPr lang="en-US" i="1" dirty="0"/>
               <a:t>F = ma</a:t>
             </a:r>
-            <a:endParaRPr lang="en-US" dirty="0" smtClean="0"/>
-          </a:p>
-          <a:p>
-            <a:r>
-              <a:rPr lang="en-US" dirty="0" smtClean="0"/>
+            <a:r>
+              <a:rPr lang="en-US" dirty="0"/>
+              <a:t> so </a:t>
+            </a:r>
+            <a:r>
+              <a:rPr lang="en-US" i="1" dirty="0"/>
+              <a:t>a = F/m</a:t>
+            </a:r>
+          </a:p>
+          <a:p>
+            <a:r>
+              <a:rPr lang="en-US" dirty="0"/>
               <a:t>Repeat for multiple time steps</a:t>
             </a:r>
           </a:p>
           <a:p>
             <a:pPr lvl="1"/>
             <a:r>
-              <a:rPr lang="en-US" dirty="0" smtClean="0"/>
+              <a:rPr lang="en-US" dirty="0"/>
               <a:t>If a time step is one hour, there are 8766 time steps per simulated year</a:t>
             </a:r>
           </a:p>
@@ -4061,87 +4032,89 @@
           <a:lstStyle/>
           <a:p>
             <a:r>
-              <a:rPr lang="en-US" dirty="0" smtClean="0"/>
+              <a:rPr lang="en-US" dirty="0"/>
               <a:t>Inaccurate</a:t>
             </a:r>
+          </a:p>
+        </p:txBody>
+      </p:sp>
+      <p:sp>
+        <p:nvSpPr>
+          <p:cNvPr id="3" name="Content Placeholder 2"/>
+          <p:cNvSpPr>
+            <a:spLocks noGrp="1"/>
+          </p:cNvSpPr>
+          <p:nvPr>
+            <p:ph idx="1"/>
+          </p:nvPr>
+        </p:nvSpPr>
+        <p:spPr/>
+        <p:txBody>
+          <a:bodyPr/>
+          <a:lstStyle/>
+          <a:p>
+            <a:r>
+              <a:rPr lang="en-US" dirty="0"/>
+              <a:t>In real life time is continuous</a:t>
+            </a:r>
+          </a:p>
+          <a:p>
+            <a:pPr lvl="1"/>
+            <a:r>
+              <a:rPr lang="en-US" dirty="0"/>
+              <a:t>Velocity changes smoothly over a time step</a:t>
+            </a:r>
+          </a:p>
+          <a:p>
+            <a:r>
+              <a:rPr lang="en-US" dirty="0"/>
+              <a:t>In our simulation velocity is constant during a time step</a:t>
+            </a:r>
+          </a:p>
+          <a:p>
+            <a:pPr lvl="1"/>
+            <a:r>
+              <a:rPr lang="en-US" dirty="0"/>
+              <a:t>… makes an abrupt change at the end of the time step</a:t>
+            </a:r>
+          </a:p>
+          <a:p>
+            <a:r>
+              <a:rPr lang="en-US" dirty="0"/>
+              <a:t>We can increase accuracy by making shorter time steps</a:t>
+            </a:r>
+          </a:p>
+          <a:p>
+            <a:pPr lvl="1"/>
+            <a:r>
+              <a:rPr lang="en-US" dirty="0"/>
+              <a:t>Particularly important when velocity changes rapidly</a:t>
+            </a:r>
+          </a:p>
+          <a:p>
+            <a:pPr lvl="1"/>
+            <a:r>
+              <a:rPr lang="en-US" dirty="0"/>
+              <a:t>… such as during a close approaches between two objects</a:t>
+            </a:r>
+          </a:p>
+          <a:p>
+            <a:r>
+              <a:rPr lang="en-US" b="1" dirty="0"/>
+              <a:t>Small time steps greatly increase computation time</a:t>
+            </a:r>
             <a:endParaRPr lang="en-US" dirty="0"/>
           </a:p>
-        </p:txBody>
-      </p:sp>
-      <p:sp>
-        <p:nvSpPr>
-          <p:cNvPr id="3" name="Content Placeholder 2"/>
-          <p:cNvSpPr>
-            <a:spLocks noGrp="1"/>
-          </p:cNvSpPr>
-          <p:nvPr>
-            <p:ph idx="1"/>
-          </p:nvPr>
-        </p:nvSpPr>
-        <p:spPr/>
-        <p:txBody>
-          <a:bodyPr/>
-          <a:lstStyle/>
-          <a:p>
-            <a:r>
-              <a:rPr lang="en-US" dirty="0" smtClean="0"/>
-              <a:t>In real life time is continuous (for our purposes)</a:t>
-            </a:r>
-          </a:p>
           <a:p>
             <a:pPr lvl="1"/>
             <a:r>
-              <a:rPr lang="en-US" dirty="0" smtClean="0"/>
-              <a:t>Velocity changes smoothly over a time step</a:t>
-            </a:r>
-          </a:p>
-          <a:p>
-            <a:r>
-              <a:rPr lang="en-US" dirty="0" smtClean="0"/>
-              <a:t>In our simulation velocity is constant during a time step</a:t>
-            </a:r>
-          </a:p>
-          <a:p>
-            <a:pPr lvl="1"/>
-            <a:r>
-              <a:rPr lang="en-US" dirty="0" smtClean="0"/>
-              <a:t>… makes an abrupt change at the end of the time step</a:t>
-            </a:r>
-          </a:p>
-          <a:p>
-            <a:r>
-              <a:rPr lang="en-US" dirty="0" smtClean="0"/>
-              <a:t>We can increase accuracy by making shorter time steps</a:t>
-            </a:r>
-          </a:p>
-          <a:p>
-            <a:pPr lvl="1"/>
-            <a:r>
-              <a:rPr lang="en-US" dirty="0" smtClean="0"/>
-              <a:t>Particularly important when velocity changes rapidly</a:t>
-            </a:r>
-          </a:p>
-          <a:p>
-            <a:pPr lvl="1"/>
-            <a:r>
-              <a:rPr lang="en-US" dirty="0" smtClean="0"/>
-              <a:t>… such as during a close approaches between two objects</a:t>
-            </a:r>
-          </a:p>
-          <a:p>
-            <a:r>
-              <a:rPr lang="en-US" b="1" dirty="0" smtClean="0"/>
-              <a:t>Small time steps greatly increase computation time</a:t>
-            </a:r>
-            <a:endParaRPr lang="en-US" dirty="0" smtClean="0"/>
-          </a:p>
-          <a:p>
-            <a:pPr lvl="1"/>
-            <a:r>
-              <a:rPr lang="en-US" i="1" dirty="0" smtClean="0"/>
+              <a:rPr lang="en-US" i="1" dirty="0">
+                <a:solidFill>
+                  <a:schemeClr val="accent2"/>
+                </a:solidFill>
+              </a:rPr>
               <a:t>Trade off between computation time and accuracy!</a:t>
             </a:r>
-            <a:endParaRPr lang="en-US" i="1" dirty="0"/>
           </a:p>
         </p:txBody>
       </p:sp>
@@ -4191,10 +4164,9 @@
           <a:lstStyle/>
           <a:p>
             <a:r>
-              <a:rPr lang="en-US" dirty="0" smtClean="0"/>
+              <a:rPr lang="en-US" dirty="0"/>
               <a:t>Ideally…</a:t>
             </a:r>
-            <a:endParaRPr lang="en-US" dirty="0"/>
           </a:p>
         </p:txBody>
       </p:sp>
@@ -4214,11 +4186,11 @@
           <a:lstStyle/>
           <a:p>
             <a:r>
-              <a:rPr lang="en-US" dirty="0" smtClean="0"/>
-              <a:t>We would </a:t>
-            </a:r>
-            <a:r>
-              <a:rPr lang="en-US" dirty="0" smtClean="0">
+              <a:rPr lang="en-US" dirty="0"/>
+              <a:t>We should </a:t>
+            </a:r>
+            <a:r>
+              <a:rPr lang="en-US" dirty="0">
                 <a:solidFill>
                   <a:srgbClr val="FF0000"/>
                 </a:solidFill>
@@ -4226,29 +4198,24 @@
               <a:t>understand what accuracy we need</a:t>
             </a:r>
             <a:r>
-              <a:rPr lang="en-US" dirty="0" smtClean="0"/>
+              <a:rPr lang="en-US" dirty="0"/>
               <a:t>…</a:t>
             </a:r>
           </a:p>
           <a:p>
             <a:pPr lvl="1"/>
             <a:r>
-              <a:rPr lang="en-US" dirty="0" smtClean="0"/>
+              <a:rPr lang="en-US" dirty="0"/>
               <a:t>… and then </a:t>
             </a:r>
             <a:r>
-              <a:rPr lang="en-US" dirty="0" smtClean="0">
+              <a:rPr lang="en-US" dirty="0">
                 <a:solidFill>
-                  <a:srgbClr val="FF0000"/>
+                  <a:schemeClr val="accent2"/>
                 </a:solidFill>
               </a:rPr>
               <a:t>compute no harder than necessary</a:t>
             </a:r>
-            <a:endParaRPr lang="en-US" dirty="0">
-              <a:solidFill>
-                <a:srgbClr val="FF0000"/>
-              </a:solidFill>
-            </a:endParaRPr>
           </a:p>
         </p:txBody>
       </p:sp>
@@ -4298,10 +4265,9 @@
           <a:lstStyle/>
           <a:p>
             <a:r>
-              <a:rPr lang="en-US" dirty="0" smtClean="0"/>
+              <a:rPr lang="en-US" dirty="0"/>
               <a:t>More Issues</a:t>
             </a:r>
-            <a:endParaRPr lang="en-US" dirty="0"/>
           </a:p>
         </p:txBody>
       </p:sp>
@@ -4321,50 +4287,65 @@
           <a:lstStyle/>
           <a:p>
             <a:r>
-              <a:rPr lang="en-US" dirty="0" smtClean="0"/>
+              <a:rPr lang="en-US" dirty="0"/>
               <a:t>What we are doing is essentially numerical integration</a:t>
             </a:r>
           </a:p>
           <a:p>
             <a:pPr lvl="1"/>
             <a:r>
-              <a:rPr lang="en-US" dirty="0" smtClean="0"/>
+              <a:rPr lang="en-US" dirty="0"/>
               <a:t>Many algorithms for this are known</a:t>
             </a:r>
           </a:p>
           <a:p>
             <a:r>
-              <a:rPr lang="en-US" dirty="0" smtClean="0"/>
+              <a:rPr lang="en-US" dirty="0"/>
               <a:t>Advanced integration methods use past history to estimate the future</a:t>
             </a:r>
           </a:p>
           <a:p>
             <a:pPr lvl="1"/>
             <a:r>
-              <a:rPr lang="en-US" dirty="0" smtClean="0"/>
-              <a:t>… can give reasonable accuracy with courser time steps</a:t>
+              <a:rPr lang="en-US" dirty="0"/>
+              <a:t>… can give </a:t>
+            </a:r>
+            <a:r>
+              <a:rPr lang="en-US" dirty="0">
+                <a:solidFill>
+                  <a:schemeClr val="accent6"/>
+                </a:solidFill>
+              </a:rPr>
+              <a:t>reasonable accuracy with courser time steps</a:t>
             </a:r>
           </a:p>
           <a:p>
             <a:pPr lvl="1"/>
             <a:r>
-              <a:rPr lang="en-US" dirty="0" smtClean="0"/>
-              <a:t>… but require more computation to make the estimates</a:t>
-            </a:r>
-          </a:p>
-          <a:p>
-            <a:r>
-              <a:rPr lang="en-US" i="1" dirty="0" smtClean="0"/>
+              <a:rPr lang="en-US" dirty="0"/>
+              <a:t>… but </a:t>
+            </a:r>
+            <a:r>
+              <a:rPr lang="en-US" dirty="0">
+                <a:solidFill>
+                  <a:schemeClr val="accent2"/>
+                </a:solidFill>
+              </a:rPr>
+              <a:t>require more computation to make the estimates</a:t>
+            </a:r>
+          </a:p>
+          <a:p>
+            <a:r>
+              <a:rPr lang="en-US" i="1" dirty="0"/>
               <a:t>Ideally we would use a numerical integration method that optimizes computation time while respecting desired accuracy</a:t>
             </a:r>
           </a:p>
           <a:p>
             <a:pPr lvl="1"/>
             <a:r>
-              <a:rPr lang="en-US" dirty="0" smtClean="0"/>
+              <a:rPr lang="en-US" dirty="0"/>
               <a:t>This is a subject for a future version of the program</a:t>
             </a:r>
-            <a:endParaRPr lang="en-US" dirty="0"/>
           </a:p>
         </p:txBody>
       </p:sp>
@@ -4414,10 +4395,9 @@
           <a:lstStyle/>
           <a:p>
             <a:r>
-              <a:rPr lang="en-US" dirty="0" smtClean="0"/>
+              <a:rPr lang="en-US" dirty="0"/>
               <a:t>Still More Issues</a:t>
             </a:r>
-            <a:endParaRPr lang="en-US" dirty="0"/>
           </a:p>
         </p:txBody>
       </p:sp>
@@ -4437,98 +4417,105 @@
           <a:lstStyle/>
           <a:p>
             <a:r>
-              <a:rPr lang="en-US" dirty="0" smtClean="0"/>
-              <a:t>Our algorithm, </a:t>
-            </a:r>
-            <a:r>
-              <a:rPr lang="en-US" i="1" dirty="0" smtClean="0"/>
+              <a:rPr lang="en-US" dirty="0"/>
+              <a:t>Our algorithm, “</a:t>
+            </a:r>
+            <a:r>
+              <a:rPr lang="en-US" i="1" dirty="0"/>
               <a:t>All Pairs</a:t>
             </a:r>
             <a:r>
-              <a:rPr lang="en-US" dirty="0" smtClean="0"/>
-              <a:t>, is </a:t>
-            </a:r>
-            <a:r>
-              <a:rPr lang="en-US" i="1" dirty="0" smtClean="0"/>
+              <a:rPr lang="en-US" dirty="0"/>
+              <a:t>,” is </a:t>
+            </a:r>
+            <a:r>
+              <a:rPr lang="en-US" i="1" dirty="0"/>
               <a:t>O(N</a:t>
             </a:r>
             <a:r>
-              <a:rPr lang="en-US" i="1" baseline="30000" dirty="0" smtClean="0"/>
+              <a:rPr lang="en-US" i="1" baseline="30000" dirty="0"/>
               <a:t>2</a:t>
             </a:r>
             <a:r>
-              <a:rPr lang="en-US" i="1" dirty="0" smtClean="0"/>
+              <a:rPr lang="en-US" i="1" dirty="0"/>
               <a:t>)</a:t>
             </a:r>
           </a:p>
           <a:p>
             <a:r>
-              <a:rPr lang="en-US" dirty="0" smtClean="0"/>
+              <a:rPr lang="en-US" dirty="0"/>
               <a:t>Better algorithms exist for solving the N-body problem!</a:t>
             </a:r>
           </a:p>
           <a:p>
             <a:pPr lvl="1"/>
             <a:r>
-              <a:rPr lang="en-US" dirty="0" smtClean="0"/>
+              <a:rPr lang="en-US" dirty="0"/>
               <a:t>Barnes Hut runs in </a:t>
             </a:r>
             <a:r>
-              <a:rPr lang="en-US" i="1" dirty="0" smtClean="0"/>
+              <a:rPr lang="en-US" i="1" dirty="0"/>
               <a:t>O(N log(N)) </a:t>
             </a:r>
             <a:r>
-              <a:rPr lang="en-US" dirty="0" smtClean="0"/>
+              <a:rPr lang="en-US" dirty="0"/>
               <a:t>time</a:t>
             </a:r>
           </a:p>
           <a:p>
             <a:pPr lvl="2"/>
             <a:r>
-              <a:rPr lang="en-US" dirty="0" smtClean="0"/>
+              <a:rPr lang="en-US" dirty="0"/>
               <a:t>A huge improvement!</a:t>
             </a:r>
           </a:p>
           <a:p>
             <a:pPr lvl="1"/>
             <a:r>
-              <a:rPr lang="en-US" dirty="0" smtClean="0"/>
+              <a:rPr lang="en-US" dirty="0"/>
               <a:t>… but is not 100% accurate</a:t>
             </a:r>
           </a:p>
           <a:p>
             <a:pPr lvl="1"/>
             <a:r>
-              <a:rPr lang="en-US" dirty="0" smtClean="0"/>
+              <a:rPr lang="en-US" dirty="0"/>
               <a:t>This adds another wrinkle to the accuracy vs computation time trade off</a:t>
             </a:r>
           </a:p>
           <a:p>
             <a:r>
-              <a:rPr lang="en-US" dirty="0" smtClean="0"/>
+              <a:rPr lang="en-US" dirty="0"/>
               <a:t>A serious computation would…</a:t>
             </a:r>
           </a:p>
           <a:p>
             <a:pPr lvl="1"/>
             <a:r>
-              <a:rPr lang="en-US" dirty="0" smtClean="0"/>
+              <a:rPr lang="en-US" dirty="0"/>
               <a:t>Use the best algorithms available</a:t>
             </a:r>
           </a:p>
           <a:p>
             <a:pPr lvl="1"/>
             <a:r>
-              <a:rPr lang="en-US" dirty="0" smtClean="0"/>
-              <a:t>Compute an answer as inaccurately (as quickly) as possible</a:t>
-            </a:r>
-          </a:p>
-          <a:p>
-            <a:r>
-              <a:rPr lang="en-US" i="1" dirty="0" smtClean="0"/>
+              <a:rPr lang="en-US" dirty="0"/>
+              <a:t>Compute an answer </a:t>
+            </a:r>
+            <a:r>
+              <a:rPr lang="en-US" u="sng" dirty="0"/>
+              <a:t>as inaccurately</a:t>
+            </a:r>
+            <a:r>
+              <a:rPr lang="en-US" dirty="0"/>
+              <a:t> (i. e., as quickly) as possible</a:t>
+            </a:r>
+          </a:p>
+          <a:p>
+            <a:r>
+              <a:rPr lang="en-US" i="1" dirty="0"/>
               <a:t>We are interested in parallel programming so these points are minor</a:t>
             </a:r>
-            <a:endParaRPr lang="en-US" i="1" dirty="0"/>
           </a:p>
         </p:txBody>
       </p:sp>

</xml_diff>

<commit_message>
Minor fixes to the Solarium presentation.
</commit_message>
<xml_diff>
--- a/doc/Solarium.pptx
+++ b/doc/Solarium.pptx
@@ -119,10 +119,6 @@
 </p:presentation>
 </file>
 
-<file path=ppt/revisionInfo.xml><?xml version="1.0" encoding="utf-8"?>
-<p1510:revInfo xmlns:a="http://schemas.openxmlformats.org/drawingml/2006/main" xmlns:r="http://schemas.openxmlformats.org/officeDocument/2006/relationships" xmlns:p1510="http://schemas.microsoft.com/office/powerpoint/2015/10/main"/>
-</file>
-
 <file path=ppt/slideLayouts/slideLayout1.xml><?xml version="1.0" encoding="utf-8"?>
 <p:sldLayout xmlns:a="http://schemas.openxmlformats.org/drawingml/2006/main" xmlns:r="http://schemas.openxmlformats.org/officeDocument/2006/relationships" xmlns:p="http://schemas.openxmlformats.org/presentationml/2006/main" type="title" preserve="1">
   <p:cSld name="Title Slide">
@@ -252,7 +248,7 @@
           <a:p>
             <a:fld id="{422AF894-0F86-4334-AADC-73402EE9FAEC}" type="datetimeFigureOut">
               <a:rPr lang="en-US" smtClean="0"/>
-              <a:t>2018-01-22</a:t>
+              <a:t>1/31/24</a:t>
             </a:fld>
             <a:endParaRPr lang="en-US"/>
           </a:p>
@@ -420,7 +416,7 @@
           <a:p>
             <a:fld id="{422AF894-0F86-4334-AADC-73402EE9FAEC}" type="datetimeFigureOut">
               <a:rPr lang="en-US" smtClean="0"/>
-              <a:t>2018-01-22</a:t>
+              <a:t>1/31/24</a:t>
             </a:fld>
             <a:endParaRPr lang="en-US"/>
           </a:p>
@@ -598,7 +594,7 @@
           <a:p>
             <a:fld id="{422AF894-0F86-4334-AADC-73402EE9FAEC}" type="datetimeFigureOut">
               <a:rPr lang="en-US" smtClean="0"/>
-              <a:t>2018-01-22</a:t>
+              <a:t>1/31/24</a:t>
             </a:fld>
             <a:endParaRPr lang="en-US"/>
           </a:p>
@@ -766,7 +762,7 @@
           <a:p>
             <a:fld id="{422AF894-0F86-4334-AADC-73402EE9FAEC}" type="datetimeFigureOut">
               <a:rPr lang="en-US" smtClean="0"/>
-              <a:t>2018-01-22</a:t>
+              <a:t>1/31/24</a:t>
             </a:fld>
             <a:endParaRPr lang="en-US"/>
           </a:p>
@@ -1011,7 +1007,7 @@
           <a:p>
             <a:fld id="{422AF894-0F86-4334-AADC-73402EE9FAEC}" type="datetimeFigureOut">
               <a:rPr lang="en-US" smtClean="0"/>
-              <a:t>2018-01-22</a:t>
+              <a:t>1/31/24</a:t>
             </a:fld>
             <a:endParaRPr lang="en-US"/>
           </a:p>
@@ -1240,7 +1236,7 @@
           <a:p>
             <a:fld id="{422AF894-0F86-4334-AADC-73402EE9FAEC}" type="datetimeFigureOut">
               <a:rPr lang="en-US" smtClean="0"/>
-              <a:t>2018-01-22</a:t>
+              <a:t>1/31/24</a:t>
             </a:fld>
             <a:endParaRPr lang="en-US"/>
           </a:p>
@@ -1604,7 +1600,7 @@
           <a:p>
             <a:fld id="{422AF894-0F86-4334-AADC-73402EE9FAEC}" type="datetimeFigureOut">
               <a:rPr lang="en-US" smtClean="0"/>
-              <a:t>2018-01-22</a:t>
+              <a:t>1/31/24</a:t>
             </a:fld>
             <a:endParaRPr lang="en-US"/>
           </a:p>
@@ -1721,7 +1717,7 @@
           <a:p>
             <a:fld id="{422AF894-0F86-4334-AADC-73402EE9FAEC}" type="datetimeFigureOut">
               <a:rPr lang="en-US" smtClean="0"/>
-              <a:t>2018-01-22</a:t>
+              <a:t>1/31/24</a:t>
             </a:fld>
             <a:endParaRPr lang="en-US"/>
           </a:p>
@@ -1816,7 +1812,7 @@
           <a:p>
             <a:fld id="{422AF894-0F86-4334-AADC-73402EE9FAEC}" type="datetimeFigureOut">
               <a:rPr lang="en-US" smtClean="0"/>
-              <a:t>2018-01-22</a:t>
+              <a:t>1/31/24</a:t>
             </a:fld>
             <a:endParaRPr lang="en-US"/>
           </a:p>
@@ -2091,7 +2087,7 @@
           <a:p>
             <a:fld id="{422AF894-0F86-4334-AADC-73402EE9FAEC}" type="datetimeFigureOut">
               <a:rPr lang="en-US" smtClean="0"/>
-              <a:t>2018-01-22</a:t>
+              <a:t>1/31/24</a:t>
             </a:fld>
             <a:endParaRPr lang="en-US"/>
           </a:p>
@@ -2343,7 +2339,7 @@
           <a:p>
             <a:fld id="{422AF894-0F86-4334-AADC-73402EE9FAEC}" type="datetimeFigureOut">
               <a:rPr lang="en-US" smtClean="0"/>
-              <a:t>2018-01-22</a:t>
+              <a:t>1/31/24</a:t>
             </a:fld>
             <a:endParaRPr lang="en-US"/>
           </a:p>
@@ -2554,7 +2550,7 @@
           <a:p>
             <a:fld id="{422AF894-0F86-4334-AADC-73402EE9FAEC}" type="datetimeFigureOut">
               <a:rPr lang="en-US" smtClean="0"/>
-              <a:t>2018-01-22</a:t>
+              <a:t>1/31/24</a:t>
             </a:fld>
             <a:endParaRPr lang="en-US"/>
           </a:p>
@@ -3760,7 +3756,7 @@
           <a:p>
             <a:r>
               <a:rPr lang="en-US" dirty="0"/>
-              <a:t>Simulates movement of solar system objects</a:t>
+              <a:t>Simulates the movement of solar system objects</a:t>
             </a:r>
           </a:p>
           <a:p>
@@ -3808,7 +3804,7 @@
           <a:p>
             <a:r>
               <a:rPr lang="en-US" dirty="0"/>
-              <a:t>Each object represented by a “dynamics”</a:t>
+              <a:t>Each object is represented by a “dynamics.”</a:t>
             </a:r>
           </a:p>
           <a:p>
@@ -3896,7 +3892,7 @@
           <a:p>
             <a:r>
               <a:rPr lang="en-US" dirty="0"/>
-              <a:t>Time is divided into “time steps”</a:t>
+              <a:t>Time is divided into “time steps.”</a:t>
             </a:r>
           </a:p>
           <a:p>
@@ -4055,7 +4051,7 @@
           <a:p>
             <a:r>
               <a:rPr lang="en-US" dirty="0"/>
-              <a:t>In real life time is continuous</a:t>
+              <a:t>In real life time is continuous.</a:t>
             </a:r>
           </a:p>
           <a:p>
@@ -4088,20 +4084,20 @@
             <a:pPr lvl="1"/>
             <a:r>
               <a:rPr lang="en-US" dirty="0"/>
-              <a:t>Particularly important when velocity changes rapidly</a:t>
+              <a:t>This is particularly important when velocity changes rapidly</a:t>
             </a:r>
           </a:p>
           <a:p>
             <a:pPr lvl="1"/>
             <a:r>
               <a:rPr lang="en-US" dirty="0"/>
-              <a:t>… such as during a close approaches between two objects</a:t>
+              <a:t>… such as during a close approach between two objects</a:t>
             </a:r>
           </a:p>
           <a:p>
             <a:r>
               <a:rPr lang="en-US" b="1" dirty="0"/>
-              <a:t>Small time steps greatly increase computation time</a:t>
+              <a:t>Small time steps significantly increase computation time</a:t>
             </a:r>
             <a:endParaRPr lang="en-US" dirty="0"/>
           </a:p>
@@ -4113,7 +4109,7 @@
                   <a:schemeClr val="accent2"/>
                 </a:solidFill>
               </a:rPr>
-              <a:t>Trade off between computation time and accuracy!</a:t>
+              <a:t>A trade-off between computation time and accuracy!</a:t>
             </a:r>
           </a:p>
         </p:txBody>
@@ -4337,7 +4333,7 @@
           <a:p>
             <a:r>
               <a:rPr lang="en-US" i="1" dirty="0"/>
-              <a:t>Ideally we would use a numerical integration method that optimizes computation time while respecting desired accuracy</a:t>
+              <a:t>Ideally, we would use a numerical integration method that optimizes computation time while respecting the desired accuracy</a:t>
             </a:r>
           </a:p>
           <a:p>
@@ -4451,7 +4447,7 @@
             <a:pPr lvl="1"/>
             <a:r>
               <a:rPr lang="en-US" dirty="0"/>
-              <a:t>Barnes Hut runs in </a:t>
+              <a:t>Barnes-Hut runs in </a:t>
             </a:r>
             <a:r>
               <a:rPr lang="en-US" i="1" dirty="0"/>
@@ -4480,7 +4476,7 @@
             <a:pPr lvl="1"/>
             <a:r>
               <a:rPr lang="en-US" dirty="0"/>
-              <a:t>This adds another wrinkle to the accuracy vs computation time trade off</a:t>
+              <a:t>This adds another wrinkle to the accuracy vs computation time trade-off</a:t>
             </a:r>
           </a:p>
           <a:p>
@@ -4493,7 +4489,7 @@
             <a:pPr lvl="1"/>
             <a:r>
               <a:rPr lang="en-US" dirty="0"/>
-              <a:t>Use the best algorithms available</a:t>
+              <a:t>Use the best algorithms available.</a:t>
             </a:r>
           </a:p>
           <a:p>
@@ -4508,13 +4504,13 @@
             </a:r>
             <a:r>
               <a:rPr lang="en-US" dirty="0"/>
-              <a:t> (i. e., as quickly) as possible</a:t>
+              <a:t> (i.e., as quickly) as possible</a:t>
             </a:r>
           </a:p>
           <a:p>
             <a:r>
               <a:rPr lang="en-US" i="1" dirty="0"/>
-              <a:t>We are interested in parallel programming so these points are minor</a:t>
+              <a:t>We are interested in parallel programming, so these points are minor</a:t>
             </a:r>
           </a:p>
         </p:txBody>

</xml_diff>

<commit_message>
Minor adjustments to the BarnesHut version of Solarium.
</commit_message>
<xml_diff>
--- a/doc/Solarium.pptx
+++ b/doc/Solarium.pptx
@@ -248,7 +248,7 @@
           <a:p>
             <a:fld id="{422AF894-0F86-4334-AADC-73402EE9FAEC}" type="datetimeFigureOut">
               <a:rPr lang="en-US" smtClean="0"/>
-              <a:t>1/31/24</a:t>
+              <a:t>3/5/24</a:t>
             </a:fld>
             <a:endParaRPr lang="en-US"/>
           </a:p>
@@ -416,7 +416,7 @@
           <a:p>
             <a:fld id="{422AF894-0F86-4334-AADC-73402EE9FAEC}" type="datetimeFigureOut">
               <a:rPr lang="en-US" smtClean="0"/>
-              <a:t>1/31/24</a:t>
+              <a:t>3/5/24</a:t>
             </a:fld>
             <a:endParaRPr lang="en-US"/>
           </a:p>
@@ -594,7 +594,7 @@
           <a:p>
             <a:fld id="{422AF894-0F86-4334-AADC-73402EE9FAEC}" type="datetimeFigureOut">
               <a:rPr lang="en-US" smtClean="0"/>
-              <a:t>1/31/24</a:t>
+              <a:t>3/5/24</a:t>
             </a:fld>
             <a:endParaRPr lang="en-US"/>
           </a:p>
@@ -762,7 +762,7 @@
           <a:p>
             <a:fld id="{422AF894-0F86-4334-AADC-73402EE9FAEC}" type="datetimeFigureOut">
               <a:rPr lang="en-US" smtClean="0"/>
-              <a:t>1/31/24</a:t>
+              <a:t>3/5/24</a:t>
             </a:fld>
             <a:endParaRPr lang="en-US"/>
           </a:p>
@@ -1007,7 +1007,7 @@
           <a:p>
             <a:fld id="{422AF894-0F86-4334-AADC-73402EE9FAEC}" type="datetimeFigureOut">
               <a:rPr lang="en-US" smtClean="0"/>
-              <a:t>1/31/24</a:t>
+              <a:t>3/5/24</a:t>
             </a:fld>
             <a:endParaRPr lang="en-US"/>
           </a:p>
@@ -1236,7 +1236,7 @@
           <a:p>
             <a:fld id="{422AF894-0F86-4334-AADC-73402EE9FAEC}" type="datetimeFigureOut">
               <a:rPr lang="en-US" smtClean="0"/>
-              <a:t>1/31/24</a:t>
+              <a:t>3/5/24</a:t>
             </a:fld>
             <a:endParaRPr lang="en-US"/>
           </a:p>
@@ -1600,7 +1600,7 @@
           <a:p>
             <a:fld id="{422AF894-0F86-4334-AADC-73402EE9FAEC}" type="datetimeFigureOut">
               <a:rPr lang="en-US" smtClean="0"/>
-              <a:t>1/31/24</a:t>
+              <a:t>3/5/24</a:t>
             </a:fld>
             <a:endParaRPr lang="en-US"/>
           </a:p>
@@ -1717,7 +1717,7 @@
           <a:p>
             <a:fld id="{422AF894-0F86-4334-AADC-73402EE9FAEC}" type="datetimeFigureOut">
               <a:rPr lang="en-US" smtClean="0"/>
-              <a:t>1/31/24</a:t>
+              <a:t>3/5/24</a:t>
             </a:fld>
             <a:endParaRPr lang="en-US"/>
           </a:p>
@@ -1812,7 +1812,7 @@
           <a:p>
             <a:fld id="{422AF894-0F86-4334-AADC-73402EE9FAEC}" type="datetimeFigureOut">
               <a:rPr lang="en-US" smtClean="0"/>
-              <a:t>1/31/24</a:t>
+              <a:t>3/5/24</a:t>
             </a:fld>
             <a:endParaRPr lang="en-US"/>
           </a:p>
@@ -2087,7 +2087,7 @@
           <a:p>
             <a:fld id="{422AF894-0F86-4334-AADC-73402EE9FAEC}" type="datetimeFigureOut">
               <a:rPr lang="en-US" smtClean="0"/>
-              <a:t>1/31/24</a:t>
+              <a:t>3/5/24</a:t>
             </a:fld>
             <a:endParaRPr lang="en-US"/>
           </a:p>
@@ -2339,7 +2339,7 @@
           <a:p>
             <a:fld id="{422AF894-0F86-4334-AADC-73402EE9FAEC}" type="datetimeFigureOut">
               <a:rPr lang="en-US" smtClean="0"/>
-              <a:t>1/31/24</a:t>
+              <a:t>3/5/24</a:t>
             </a:fld>
             <a:endParaRPr lang="en-US"/>
           </a:p>
@@ -2550,7 +2550,7 @@
           <a:p>
             <a:fld id="{422AF894-0F86-4334-AADC-73402EE9FAEC}" type="datetimeFigureOut">
               <a:rPr lang="en-US" smtClean="0"/>
-              <a:t>1/31/24</a:t>
+              <a:t>3/5/24</a:t>
             </a:fld>
             <a:endParaRPr lang="en-US"/>
           </a:p>
@@ -4051,7 +4051,7 @@
           <a:p>
             <a:r>
               <a:rPr lang="en-US" dirty="0"/>
-              <a:t>In real life time is continuous.</a:t>
+              <a:t>In real life, time is continuous.</a:t>
             </a:r>
           </a:p>
           <a:p>
@@ -4064,7 +4064,7 @@
           <a:p>
             <a:r>
               <a:rPr lang="en-US" dirty="0"/>
-              <a:t>In our simulation velocity is constant during a time step</a:t>
+              <a:t>In our simulation, velocity is constant during a time step</a:t>
             </a:r>
           </a:p>
           <a:p>
@@ -4434,7 +4434,7 @@
             </a:r>
             <a:r>
               <a:rPr lang="en-US" i="1" dirty="0"/>
-              <a:t>)</a:t>
+              <a:t>).</a:t>
             </a:r>
           </a:p>
           <a:p>
@@ -4451,12 +4451,17 @@
             </a:r>
             <a:r>
               <a:rPr lang="en-US" i="1" dirty="0"/>
-              <a:t>O(N log(N)) </a:t>
-            </a:r>
-            <a:r>
-              <a:rPr lang="en-US" dirty="0"/>
-              <a:t>time</a:t>
-            </a:r>
+              <a:t>O(N log(N</a:t>
+            </a:r>
+            <a:r>
+              <a:rPr lang="en-US" i="1"/>
+              <a:t>)) </a:t>
+            </a:r>
+            <a:r>
+              <a:rPr lang="en-US"/>
+              <a:t>time.</a:t>
+            </a:r>
+            <a:endParaRPr lang="en-US" dirty="0"/>
           </a:p>
           <a:p>
             <a:pPr lvl="2"/>
@@ -4469,14 +4474,14 @@
             <a:pPr lvl="1"/>
             <a:r>
               <a:rPr lang="en-US" dirty="0"/>
-              <a:t>… but is not 100% accurate</a:t>
+              <a:t>… but it is not 100% accurate.</a:t>
             </a:r>
           </a:p>
           <a:p>
             <a:pPr lvl="1"/>
             <a:r>
               <a:rPr lang="en-US" dirty="0"/>
-              <a:t>This adds another wrinkle to the accuracy vs computation time trade-off</a:t>
+              <a:t>This adds another wrinkle to the accuracy vs computation time trade-off.</a:t>
             </a:r>
           </a:p>
           <a:p>

</xml_diff>